<commit_message>
Few changes to presentation
</commit_message>
<xml_diff>
--- a/Session 3/Python for docs - Session 3 V0.1.pptx
+++ b/Session 3/Python for docs - Session 3 V0.1.pptx
@@ -236,7 +236,7 @@
           <a:bodyPr lIns="0" rIns="0" tIns="0" bIns="0" anchor="b"/>
           <a:p>
             <a:pPr algn="r"/>
-            <a:fld id="{8E960EB5-FB9C-4B08-9B53-F8899EF11B63}" type="slidenum">
+            <a:fld id="{639A327A-5108-415B-9BAA-2209B91958FB}" type="slidenum">
               <a:rPr b="0" lang="en-IN" sz="1400" spc="-1" strike="noStrike">
                 <a:latin typeface="Times New Roman"/>
               </a:rPr>
@@ -284,7 +284,7 @@
         <p:spPr>
           <a:xfrm>
             <a:off x="914400" y="744480"/>
-            <a:ext cx="4965120" cy="3723480"/>
+            <a:ext cx="4964760" cy="3723120"/>
           </a:xfrm>
           <a:prstGeom prst="rect">
             <a:avLst/>
@@ -304,7 +304,7 @@
         <p:spPr>
           <a:xfrm>
             <a:off x="679320" y="4717440"/>
-            <a:ext cx="5434920" cy="4468320"/>
+            <a:ext cx="5434560" cy="4467960"/>
           </a:xfrm>
           <a:prstGeom prst="rect">
             <a:avLst/>
@@ -328,7 +328,7 @@
         <p:spPr>
           <a:xfrm>
             <a:off x="3848760" y="9433080"/>
-            <a:ext cx="2943720" cy="495720"/>
+            <a:ext cx="2943360" cy="495360"/>
           </a:xfrm>
           <a:prstGeom prst="rect">
             <a:avLst/>
@@ -352,7 +352,7 @@
                 <a:spcPct val="100000"/>
               </a:lnSpc>
             </a:pPr>
-            <a:fld id="{3EA8792E-57DF-4C2B-AA0D-68E9AFEF3F17}" type="slidenum">
+            <a:fld id="{2D8B6441-1E76-4A1D-ADC3-B777E06FAA33}" type="slidenum">
               <a:rPr b="0" lang="en-IN" sz="1200" spc="-1" strike="noStrike">
                 <a:solidFill>
                   <a:srgbClr val="000000"/>
@@ -403,7 +403,7 @@
         <p:spPr>
           <a:xfrm>
             <a:off x="914400" y="744480"/>
-            <a:ext cx="4965120" cy="3723480"/>
+            <a:ext cx="4964760" cy="3723120"/>
           </a:xfrm>
           <a:prstGeom prst="rect">
             <a:avLst/>
@@ -423,7 +423,7 @@
         <p:spPr>
           <a:xfrm>
             <a:off x="679320" y="4717440"/>
-            <a:ext cx="5434920" cy="4468320"/>
+            <a:ext cx="5434560" cy="4467960"/>
           </a:xfrm>
           <a:prstGeom prst="rect">
             <a:avLst/>
@@ -432,7 +432,7 @@
         <p:txBody>
           <a:bodyPr lIns="0" rIns="0" tIns="0" bIns="0"/>
           <a:p>
-            <a:pPr marL="216000" indent="-216000">
+            <a:pPr marL="216000" indent="-215640">
               <a:lnSpc>
                 <a:spcPct val="100000"/>
               </a:lnSpc>
@@ -448,7 +448,7 @@
             </a:endParaRPr>
           </a:p>
           <a:p>
-            <a:pPr marL="216000" indent="-216000">
+            <a:pPr marL="216000" indent="-215640">
               <a:lnSpc>
                 <a:spcPct val="100000"/>
               </a:lnSpc>
@@ -468,7 +468,7 @@
         <p:spPr>
           <a:xfrm>
             <a:off x="3848760" y="9433080"/>
-            <a:ext cx="2943720" cy="495720"/>
+            <a:ext cx="2943360" cy="495360"/>
           </a:xfrm>
           <a:prstGeom prst="rect">
             <a:avLst/>
@@ -492,7 +492,7 @@
                 <a:spcPct val="100000"/>
               </a:lnSpc>
             </a:pPr>
-            <a:fld id="{FAB8A12E-39D0-450E-85ED-13B5DDEEC9EE}" type="slidenum">
+            <a:fld id="{72094025-AAA6-4436-8070-8AA577A1A1FE}" type="slidenum">
               <a:rPr b="0" lang="en-IN" sz="1200" spc="-1" strike="noStrike">
                 <a:solidFill>
                   <a:srgbClr val="000000"/>
@@ -543,7 +543,7 @@
         <p:spPr>
           <a:xfrm>
             <a:off x="914400" y="744480"/>
-            <a:ext cx="4965120" cy="3723480"/>
+            <a:ext cx="4964760" cy="3723120"/>
           </a:xfrm>
           <a:prstGeom prst="rect">
             <a:avLst/>
@@ -563,7 +563,7 @@
         <p:spPr>
           <a:xfrm>
             <a:off x="679320" y="4717440"/>
-            <a:ext cx="5434920" cy="4468320"/>
+            <a:ext cx="5434560" cy="4467960"/>
           </a:xfrm>
           <a:prstGeom prst="rect">
             <a:avLst/>
@@ -593,7 +593,7 @@
         <p:spPr>
           <a:xfrm>
             <a:off x="3848760" y="9433080"/>
-            <a:ext cx="2943720" cy="495720"/>
+            <a:ext cx="2943360" cy="495360"/>
           </a:xfrm>
           <a:prstGeom prst="rect">
             <a:avLst/>
@@ -617,7 +617,7 @@
                 <a:spcPct val="100000"/>
               </a:lnSpc>
             </a:pPr>
-            <a:fld id="{FD94E034-7D6C-486A-B554-2D4E11593E91}" type="slidenum">
+            <a:fld id="{07142054-E94C-4569-8A58-7A2D867774E4}" type="slidenum">
               <a:rPr b="0" lang="en-IN" sz="1200" spc="-1" strike="noStrike">
                 <a:solidFill>
                   <a:srgbClr val="000000"/>
@@ -668,7 +668,7 @@
         <p:spPr>
           <a:xfrm>
             <a:off x="914400" y="744480"/>
-            <a:ext cx="4965120" cy="3723480"/>
+            <a:ext cx="4964760" cy="3723120"/>
           </a:xfrm>
           <a:prstGeom prst="rect">
             <a:avLst/>
@@ -688,7 +688,7 @@
         <p:spPr>
           <a:xfrm>
             <a:off x="679320" y="4717440"/>
-            <a:ext cx="5434920" cy="4468320"/>
+            <a:ext cx="5434560" cy="4467960"/>
           </a:xfrm>
           <a:prstGeom prst="rect">
             <a:avLst/>
@@ -697,7 +697,7 @@
         <p:txBody>
           <a:bodyPr lIns="0" rIns="0" tIns="0" bIns="0"/>
           <a:p>
-            <a:pPr marL="360000" indent="-359280">
+            <a:pPr marL="360000" indent="-358920">
               <a:lnSpc>
                 <a:spcPct val="130000"/>
               </a:lnSpc>
@@ -713,7 +713,7 @@
             </a:endParaRPr>
           </a:p>
           <a:p>
-            <a:pPr marL="817200" indent="-359280">
+            <a:pPr marL="817200" indent="-358920">
               <a:lnSpc>
                 <a:spcPct val="130000"/>
               </a:lnSpc>
@@ -729,7 +729,7 @@
             </a:endParaRPr>
           </a:p>
           <a:p>
-            <a:pPr marL="817200" indent="-359280">
+            <a:pPr marL="817200" indent="-358920">
               <a:lnSpc>
                 <a:spcPct val="130000"/>
               </a:lnSpc>
@@ -745,7 +745,7 @@
             </a:endParaRPr>
           </a:p>
           <a:p>
-            <a:pPr marL="817200" indent="-359280">
+            <a:pPr marL="817200" indent="-358920">
               <a:lnSpc>
                 <a:spcPct val="130000"/>
               </a:lnSpc>
@@ -765,7 +765,7 @@
         <p:spPr>
           <a:xfrm>
             <a:off x="3848760" y="9433080"/>
-            <a:ext cx="2943720" cy="495720"/>
+            <a:ext cx="2943360" cy="495360"/>
           </a:xfrm>
           <a:prstGeom prst="rect">
             <a:avLst/>
@@ -789,7 +789,7 @@
                 <a:spcPct val="100000"/>
               </a:lnSpc>
             </a:pPr>
-            <a:fld id="{0B6CF780-57BF-4D70-AD23-0A7DD1B16620}" type="slidenum">
+            <a:fld id="{501B3CF9-A526-44E3-A964-621AEB36CB54}" type="slidenum">
               <a:rPr b="0" lang="en-IN" sz="1200" spc="-1" strike="noStrike">
                 <a:solidFill>
                   <a:srgbClr val="000000"/>
@@ -840,7 +840,7 @@
         <p:spPr>
           <a:xfrm>
             <a:off x="914400" y="744480"/>
-            <a:ext cx="4965120" cy="3723480"/>
+            <a:ext cx="4964760" cy="3723120"/>
           </a:xfrm>
           <a:prstGeom prst="rect">
             <a:avLst/>
@@ -860,7 +860,7 @@
         <p:spPr>
           <a:xfrm>
             <a:off x="679320" y="4717440"/>
-            <a:ext cx="5434920" cy="4468320"/>
+            <a:ext cx="5434560" cy="4467960"/>
           </a:xfrm>
           <a:prstGeom prst="rect">
             <a:avLst/>
@@ -884,7 +884,7 @@
         <p:spPr>
           <a:xfrm>
             <a:off x="3848760" y="9433080"/>
-            <a:ext cx="2943720" cy="495720"/>
+            <a:ext cx="2943360" cy="495360"/>
           </a:xfrm>
           <a:prstGeom prst="rect">
             <a:avLst/>
@@ -908,7 +908,7 @@
                 <a:spcPct val="100000"/>
               </a:lnSpc>
             </a:pPr>
-            <a:fld id="{5180BE2C-DE00-42D7-8E04-B32D9E10BE59}" type="slidenum">
+            <a:fld id="{B674CC5C-6D80-48E7-B8FA-53AAD2CD13BF}" type="slidenum">
               <a:rPr b="0" lang="en-IN" sz="1200" spc="-1" strike="noStrike">
                 <a:solidFill>
                   <a:srgbClr val="000000"/>
@@ -959,7 +959,7 @@
         <p:spPr>
           <a:xfrm>
             <a:off x="914400" y="744480"/>
-            <a:ext cx="4965120" cy="3723480"/>
+            <a:ext cx="4964760" cy="3723120"/>
           </a:xfrm>
           <a:prstGeom prst="rect">
             <a:avLst/>
@@ -979,7 +979,7 @@
         <p:spPr>
           <a:xfrm>
             <a:off x="679320" y="4717440"/>
-            <a:ext cx="5434920" cy="4468320"/>
+            <a:ext cx="5434560" cy="4467960"/>
           </a:xfrm>
           <a:prstGeom prst="rect">
             <a:avLst/>
@@ -1003,7 +1003,7 @@
         <p:spPr>
           <a:xfrm>
             <a:off x="3848760" y="9433080"/>
-            <a:ext cx="2943720" cy="495720"/>
+            <a:ext cx="2943360" cy="495360"/>
           </a:xfrm>
           <a:prstGeom prst="rect">
             <a:avLst/>
@@ -1027,7 +1027,7 @@
                 <a:spcPct val="100000"/>
               </a:lnSpc>
             </a:pPr>
-            <a:fld id="{4993512F-0DC4-4CF4-BA34-C3C0D06CF624}" type="slidenum">
+            <a:fld id="{2E86CDD8-8D50-4FFA-A9AB-F44FDDE5CC5C}" type="slidenum">
               <a:rPr b="0" lang="en-IN" sz="1200" spc="-1" strike="noStrike">
                 <a:solidFill>
                   <a:srgbClr val="000000"/>
@@ -5081,7 +5081,7 @@
         <p:spPr>
           <a:xfrm>
             <a:off x="2369880" y="476640"/>
-            <a:ext cx="4546800" cy="1399320"/>
+            <a:ext cx="4546440" cy="1398960"/>
           </a:xfrm>
           <a:prstGeom prst="rect">
             <a:avLst/>
@@ -5104,7 +5104,7 @@
         <p:spPr>
           <a:xfrm>
             <a:off x="3069360" y="6021360"/>
-            <a:ext cx="3147840" cy="674280"/>
+            <a:ext cx="3147480" cy="673920"/>
           </a:xfrm>
           <a:prstGeom prst="rect">
             <a:avLst/>
@@ -5127,7 +5127,7 @@
         <p:spPr>
           <a:xfrm>
             <a:off x="457200" y="273600"/>
-            <a:ext cx="8229240" cy="1144800"/>
+            <a:ext cx="8228880" cy="1144440"/>
           </a:xfrm>
           <a:prstGeom prst="rect">
             <a:avLst/>
@@ -5136,14 +5136,13 @@
         <p:txBody>
           <a:bodyPr lIns="0" rIns="0" tIns="0" bIns="0" anchor="ctr"/>
           <a:p>
-            <a:pPr algn="ctr"/>
-            <a:r>
-              <a:rPr b="0" lang="en-IN" sz="4400" spc="-1" strike="noStrike">
+            <a:r>
+              <a:rPr b="0" lang="en-IN" sz="1800" spc="-1" strike="noStrike">
                 <a:latin typeface="Arial"/>
               </a:rPr>
               <a:t>Click to edit the title text format</a:t>
             </a:r>
-            <a:endParaRPr b="0" lang="en-IN" sz="4400" spc="-1" strike="noStrike">
+            <a:endParaRPr b="0" lang="en-IN" sz="1800" spc="-1" strike="noStrike">
               <a:latin typeface="Arial"/>
             </a:endParaRPr>
           </a:p>
@@ -5386,7 +5385,7 @@
         <p:spPr>
           <a:xfrm>
             <a:off x="465840" y="6348600"/>
-            <a:ext cx="656280" cy="279360"/>
+            <a:ext cx="655920" cy="279000"/>
           </a:xfrm>
           <a:prstGeom prst="rect">
             <a:avLst/>
@@ -5668,7 +5667,7 @@
         <p:spPr>
           <a:xfrm>
             <a:off x="0" y="1431000"/>
-            <a:ext cx="9143280" cy="5415840"/>
+            <a:ext cx="9142920" cy="5415480"/>
           </a:xfrm>
           <a:prstGeom prst="rect">
             <a:avLst/>
@@ -5691,7 +5690,7 @@
         <p:spPr>
           <a:xfrm>
             <a:off x="2765880" y="207720"/>
-            <a:ext cx="3425760" cy="1054440"/>
+            <a:ext cx="3425400" cy="1054080"/>
           </a:xfrm>
           <a:prstGeom prst="rect">
             <a:avLst/>
@@ -5714,7 +5713,7 @@
         <p:spPr>
           <a:xfrm>
             <a:off x="3194280" y="6021360"/>
-            <a:ext cx="2755080" cy="589680"/>
+            <a:ext cx="2754720" cy="589320"/>
           </a:xfrm>
           <a:prstGeom prst="rect">
             <a:avLst/>
@@ -5984,7 +5983,7 @@
         <p:spPr>
           <a:xfrm>
             <a:off x="1043640" y="2637000"/>
-            <a:ext cx="7642440" cy="791280"/>
+            <a:ext cx="7642080" cy="790920"/>
           </a:xfrm>
           <a:prstGeom prst="rect">
             <a:avLst/>
@@ -6015,6 +6014,7 @@
                   <a:srgbClr val="073a76"/>
                 </a:solidFill>
                 <a:latin typeface="Gill Sans"/>
+                <a:ea typeface="DejaVu Sans"/>
               </a:rPr>
               <a:t>SESSION – 3</a:t>
             </a:r>
@@ -6025,6 +6025,7 @@
                   <a:srgbClr val="073a76"/>
                 </a:solidFill>
                 <a:latin typeface="Gill Sans"/>
+                <a:ea typeface="DejaVu Sans"/>
               </a:rPr>
               <a:t>LEARNING </a:t>
             </a:r>
@@ -6095,7 +6096,7 @@
         <p:spPr>
           <a:xfrm>
             <a:off x="457200" y="274680"/>
-            <a:ext cx="8228880" cy="1142280"/>
+            <a:ext cx="8228520" cy="1141920"/>
           </a:xfrm>
           <a:prstGeom prst="rect">
             <a:avLst/>
@@ -6125,6 +6126,7 @@
                   <a:srgbClr val="084c8d"/>
                 </a:solidFill>
                 <a:latin typeface="Gill Sans"/>
+                <a:ea typeface="DejaVu Sans"/>
               </a:rPr>
               <a:t>Objectives</a:t>
             </a:r>
@@ -6143,7 +6145,7 @@
         <p:spPr>
           <a:xfrm>
             <a:off x="1103040" y="1750680"/>
-            <a:ext cx="6564600" cy="453600"/>
+            <a:ext cx="6564240" cy="453240"/>
           </a:xfrm>
           <a:custGeom>
             <a:avLst/>
@@ -6219,7 +6221,7 @@
             <a:round/>
           </a:ln>
           <a:effectLst>
-            <a:outerShdw dist="20160" dir="5400000">
+            <a:outerShdw dir="5400000" dist="20160">
               <a:srgbClr val="000000">
                 <a:alpha val="38000"/>
               </a:srgbClr>
@@ -6288,7 +6290,7 @@
         <p:spPr>
           <a:xfrm>
             <a:off x="1091160" y="2759040"/>
-            <a:ext cx="6576480" cy="453240"/>
+            <a:ext cx="6576120" cy="452880"/>
           </a:xfrm>
           <a:custGeom>
             <a:avLst/>
@@ -6364,7 +6366,7 @@
             <a:round/>
           </a:ln>
           <a:effectLst>
-            <a:outerShdw dist="20160" dir="5400000">
+            <a:outerShdw dir="5400000" dist="20160">
               <a:srgbClr val="000000">
                 <a:alpha val="38000"/>
               </a:srgbClr>
@@ -6406,7 +6408,7 @@
                 <a:latin typeface="Calibri"/>
                 <a:ea typeface="DejaVu Sans"/>
               </a:rPr>
-              <a:t>Back to scraping</a:t>
+              <a:t>Supervised Learning</a:t>
             </a:r>
             <a:endParaRPr b="0" lang="en-IN" sz="1600" spc="-1" strike="noStrike">
               <a:latin typeface="Arial"/>
@@ -6423,7 +6425,7 @@
         <p:spPr>
           <a:xfrm>
             <a:off x="946800" y="2649600"/>
-            <a:ext cx="430920" cy="430920"/>
+            <a:ext cx="430560" cy="430560"/>
           </a:xfrm>
           <a:prstGeom prst="ellipse">
             <a:avLst/>
@@ -6438,7 +6440,7 @@
             <a:round/>
           </a:ln>
           <a:effectLst>
-            <a:outerShdw dist="20160" dir="5400000">
+            <a:outerShdw dir="5400000" dist="20160">
               <a:srgbClr val="000000">
                 <a:alpha val="38000"/>
               </a:srgbClr>
@@ -6461,7 +6463,7 @@
         <p:spPr>
           <a:xfrm>
             <a:off x="924840" y="1616040"/>
-            <a:ext cx="430920" cy="430920"/>
+            <a:ext cx="430560" cy="430560"/>
           </a:xfrm>
           <a:prstGeom prst="ellipse">
             <a:avLst/>
@@ -6476,7 +6478,7 @@
             <a:round/>
           </a:ln>
           <a:effectLst>
-            <a:outerShdw dist="20160" dir="5400000">
+            <a:outerShdw dir="5400000" dist="20160">
               <a:srgbClr val="000000">
                 <a:alpha val="38000"/>
               </a:srgbClr>
@@ -6503,7 +6505,7 @@
         <p:spPr>
           <a:xfrm rot="19974000">
             <a:off x="970920" y="1668240"/>
-            <a:ext cx="323280" cy="323280"/>
+            <a:ext cx="322920" cy="322920"/>
           </a:xfrm>
           <a:prstGeom prst="rect">
             <a:avLst/>
@@ -6526,7 +6528,7 @@
         <p:spPr>
           <a:xfrm>
             <a:off x="1004040" y="2706840"/>
-            <a:ext cx="318240" cy="316800"/>
+            <a:ext cx="317880" cy="316440"/>
           </a:xfrm>
           <a:prstGeom prst="rect">
             <a:avLst/>
@@ -6545,7 +6547,7 @@
         <p:spPr>
           <a:xfrm>
             <a:off x="4068000" y="2421000"/>
-            <a:ext cx="167400" cy="150120"/>
+            <a:ext cx="167040" cy="149760"/>
           </a:xfrm>
           <a:custGeom>
             <a:avLst/>
@@ -6589,7 +6591,7 @@
             <a:noFill/>
           </a:ln>
           <a:effectLst>
-            <a:outerShdw dist="20160" dir="5400000">
+            <a:outerShdw dir="5400000" dist="20160">
               <a:srgbClr val="000000">
                 <a:alpha val="38000"/>
               </a:srgbClr>
@@ -6612,7 +6614,7 @@
         <p:spPr>
           <a:xfrm>
             <a:off x="1091160" y="2771280"/>
-            <a:ext cx="6576480" cy="453240"/>
+            <a:ext cx="6576120" cy="452880"/>
           </a:xfrm>
           <a:custGeom>
             <a:avLst/>
@@ -6688,7 +6690,7 @@
             <a:round/>
           </a:ln>
           <a:effectLst>
-            <a:outerShdw dist="20160" dir="5400000">
+            <a:outerShdw dir="5400000" dist="20160">
               <a:srgbClr val="000000">
                 <a:alpha val="38000"/>
               </a:srgbClr>
@@ -6730,7 +6732,7 @@
                 <a:latin typeface="Calibri"/>
                 <a:ea typeface="DejaVu Sans"/>
               </a:rPr>
-              <a:t>Back to Scraping</a:t>
+              <a:t>g</a:t>
             </a:r>
             <a:endParaRPr b="0" lang="en-IN" sz="1600" spc="-1" strike="noStrike">
               <a:latin typeface="Arial"/>
@@ -6747,7 +6749,7 @@
         <p:spPr>
           <a:xfrm>
             <a:off x="946800" y="2661840"/>
-            <a:ext cx="430920" cy="430920"/>
+            <a:ext cx="430560" cy="430560"/>
           </a:xfrm>
           <a:prstGeom prst="ellipse">
             <a:avLst/>
@@ -6762,7 +6764,7 @@
             <a:round/>
           </a:ln>
           <a:effectLst>
-            <a:outerShdw dist="20160" dir="5400000">
+            <a:outerShdw dir="5400000" dist="20160">
               <a:srgbClr val="000000">
                 <a:alpha val="38000"/>
               </a:srgbClr>
@@ -6789,7 +6791,7 @@
         <p:spPr>
           <a:xfrm>
             <a:off x="1004040" y="2719080"/>
-            <a:ext cx="318240" cy="316800"/>
+            <a:ext cx="317880" cy="316440"/>
           </a:xfrm>
           <a:prstGeom prst="rect">
             <a:avLst/>
@@ -6808,7 +6810,7 @@
         <p:spPr>
           <a:xfrm>
             <a:off x="4068000" y="2433240"/>
-            <a:ext cx="167400" cy="150120"/>
+            <a:ext cx="167040" cy="149760"/>
           </a:xfrm>
           <a:custGeom>
             <a:avLst/>
@@ -6852,7 +6854,7 @@
             <a:noFill/>
           </a:ln>
           <a:effectLst>
-            <a:outerShdw dist="20160" dir="5400000">
+            <a:outerShdw dir="5400000" dist="20160">
               <a:srgbClr val="000000">
                 <a:alpha val="38000"/>
               </a:srgbClr>
@@ -6927,7 +6929,7 @@
         <p:spPr>
           <a:xfrm>
             <a:off x="395640" y="1016640"/>
-            <a:ext cx="8964360" cy="4203360"/>
+            <a:ext cx="8964000" cy="4203000"/>
           </a:xfrm>
           <a:prstGeom prst="rect">
             <a:avLst/>
@@ -6946,7 +6948,7 @@
         <p:txBody>
           <a:bodyPr lIns="90000" rIns="90000" tIns="45000" bIns="45000"/>
           <a:p>
-            <a:pPr lvl="1" marL="514440" indent="-513720">
+            <a:pPr lvl="1" marL="514440" indent="-513360">
               <a:lnSpc>
                 <a:spcPct val="140000"/>
               </a:lnSpc>
@@ -6965,6 +6967,7 @@
                   <a:srgbClr val="000000"/>
                 </a:solidFill>
                 <a:latin typeface="Calibri"/>
+                <a:ea typeface="DejaVu Sans"/>
               </a:rPr>
               <a:t>Sentiment analysis done so far </a:t>
             </a:r>
@@ -6973,7 +6976,7 @@
             </a:endParaRPr>
           </a:p>
           <a:p>
-            <a:pPr lvl="1" marL="817200" indent="-359280">
+            <a:pPr lvl="1" marL="817200" indent="-358920">
               <a:lnSpc>
                 <a:spcPct val="130000"/>
               </a:lnSpc>
@@ -6995,16 +6998,16 @@
                   <a:srgbClr val="000000"/>
                 </a:solidFill>
                 <a:latin typeface="Calibri"/>
+                <a:ea typeface="DejaVu Sans"/>
               </a:rPr>
               <a:t>Corpus of sentiments found in word_sentiment.csv</a:t>
             </a:r>
             <a:endParaRPr b="0" lang="en-IN" sz="1400" spc="-1" strike="noStrike">
               <a:latin typeface="Arial"/>
-              <a:ea typeface="Microsoft YaHei"/>
-            </a:endParaRPr>
-          </a:p>
-          <a:p>
-            <a:pPr lvl="1" marL="817200" indent="-359280">
+            </a:endParaRPr>
+          </a:p>
+          <a:p>
+            <a:pPr lvl="1" marL="817200" indent="-358920">
               <a:lnSpc>
                 <a:spcPct val="130000"/>
               </a:lnSpc>
@@ -7026,16 +7029,16 @@
                   <a:srgbClr val="000000"/>
                 </a:solidFill>
                 <a:latin typeface="Calibri"/>
+                <a:ea typeface="DejaVu Sans"/>
               </a:rPr>
               <a:t>Hard-coded algorithm – user coded definition of what a good and a bad sentiment is for all words</a:t>
             </a:r>
             <a:endParaRPr b="0" lang="en-IN" sz="1400" spc="-1" strike="noStrike">
               <a:latin typeface="Arial"/>
-              <a:ea typeface="Microsoft YaHei"/>
-            </a:endParaRPr>
-          </a:p>
-          <a:p>
-            <a:pPr lvl="1" marL="817200" indent="-359280">
+            </a:endParaRPr>
+          </a:p>
+          <a:p>
+            <a:pPr lvl="1" marL="817200" indent="-358920">
               <a:lnSpc>
                 <a:spcPct val="130000"/>
               </a:lnSpc>
@@ -7057,16 +7060,16 @@
                   <a:srgbClr val="000000"/>
                 </a:solidFill>
                 <a:latin typeface="Calibri"/>
+                <a:ea typeface="DejaVu Sans"/>
               </a:rPr>
               <a:t>Too broad an assumption </a:t>
             </a:r>
             <a:endParaRPr b="0" lang="en-IN" sz="1400" spc="-1" strike="noStrike">
               <a:latin typeface="Arial"/>
-              <a:ea typeface="Microsoft YaHei"/>
-            </a:endParaRPr>
-          </a:p>
-          <a:p>
-            <a:pPr lvl="1" marL="514440" indent="-513720">
+            </a:endParaRPr>
+          </a:p>
+          <a:p>
+            <a:pPr lvl="1" marL="514440" indent="-513360">
               <a:lnSpc>
                 <a:spcPct val="140000"/>
               </a:lnSpc>
@@ -7085,6 +7088,7 @@
                   <a:srgbClr val="000000"/>
                 </a:solidFill>
                 <a:latin typeface="Calibri"/>
+                <a:ea typeface="DejaVu Sans"/>
               </a:rPr>
               <a:t>What do you do if the word does not exist in your corpus of sentiment ?</a:t>
             </a:r>
@@ -7093,7 +7097,7 @@
             </a:endParaRPr>
           </a:p>
           <a:p>
-            <a:pPr lvl="1" marL="514440" indent="-513720">
+            <a:pPr lvl="1" marL="514440" indent="-513360">
               <a:lnSpc>
                 <a:spcPct val="140000"/>
               </a:lnSpc>
@@ -7112,6 +7116,7 @@
                   <a:srgbClr val="000000"/>
                 </a:solidFill>
                 <a:latin typeface="Calibri"/>
+                <a:ea typeface="DejaVu Sans"/>
               </a:rPr>
               <a:t>ML approach</a:t>
             </a:r>
@@ -7120,7 +7125,7 @@
             </a:endParaRPr>
           </a:p>
           <a:p>
-            <a:pPr lvl="2" marL="648000" indent="-216000">
+            <a:pPr lvl="2" marL="648000" indent="-215640">
               <a:lnSpc>
                 <a:spcPct val="140000"/>
               </a:lnSpc>
@@ -7149,7 +7154,7 @@
             </a:endParaRPr>
           </a:p>
           <a:p>
-            <a:pPr lvl="2" marL="648000" indent="-216000">
+            <a:pPr lvl="2" marL="648000" indent="-215640">
               <a:lnSpc>
                 <a:spcPct val="140000"/>
               </a:lnSpc>
@@ -7178,7 +7183,7 @@
             </a:endParaRPr>
           </a:p>
           <a:p>
-            <a:pPr lvl="2" marL="648000" indent="-216000">
+            <a:pPr lvl="2" marL="648000" indent="-215640">
               <a:lnSpc>
                 <a:spcPct val="140000"/>
               </a:lnSpc>
@@ -7207,7 +7212,7 @@
             </a:endParaRPr>
           </a:p>
           <a:p>
-            <a:pPr lvl="3" marL="864000" indent="-216000">
+            <a:pPr lvl="3" marL="864000" indent="-215640">
               <a:lnSpc>
                 <a:spcPct val="140000"/>
               </a:lnSpc>
@@ -7236,7 +7241,7 @@
             </a:endParaRPr>
           </a:p>
           <a:p>
-            <a:pPr lvl="2" marL="648000" indent="-216000">
+            <a:pPr lvl="2" marL="648000" indent="-215640">
               <a:lnSpc>
                 <a:spcPct val="140000"/>
               </a:lnSpc>
@@ -7265,7 +7270,7 @@
             </a:endParaRPr>
           </a:p>
           <a:p>
-            <a:pPr lvl="3" marL="864000" indent="-216000">
+            <a:pPr lvl="3" marL="864000" indent="-215640">
               <a:lnSpc>
                 <a:spcPct val="140000"/>
               </a:lnSpc>
@@ -7367,18 +7372,13 @@
             </a:endParaRPr>
           </a:p>
           <a:p>
-            <a:pPr lvl="1" marL="514440" indent="-513720">
+            <a:pPr>
               <a:lnSpc>
                 <a:spcPct val="140000"/>
               </a:lnSpc>
               <a:spcBef>
                 <a:spcPts val="320"/>
               </a:spcBef>
-              <a:buClr>
-                <a:srgbClr val="084c8d"/>
-              </a:buClr>
-              <a:buFont typeface="Wingdings" charset="2"/>
-              <a:buChar char=""/>
             </a:pPr>
             <a:endParaRPr b="0" lang="en-IN" sz="1600" spc="-1" strike="noStrike">
               <a:latin typeface="Arial"/>
@@ -7395,7 +7395,7 @@
         <p:spPr>
           <a:xfrm>
             <a:off x="457200" y="274680"/>
-            <a:ext cx="8228880" cy="705240"/>
+            <a:ext cx="8228520" cy="704880"/>
           </a:xfrm>
           <a:prstGeom prst="rect">
             <a:avLst/>
@@ -7425,6 +7425,7 @@
                   <a:srgbClr val="084c8d"/>
                 </a:solidFill>
                 <a:latin typeface="Gill Sans"/>
+                <a:ea typeface="DejaVu Sans"/>
               </a:rPr>
               <a:t>TRADITIONAL SENTIMENT ANALYSIS</a:t>
             </a:r>
@@ -7442,8 +7443,8 @@
         </p:nvSpPr>
         <p:spPr>
           <a:xfrm flipV="1">
-            <a:off x="2592000" y="5831280"/>
-            <a:ext cx="612000" cy="360"/>
+            <a:off x="2592000" y="5830200"/>
+            <a:ext cx="611640" cy="360"/>
           </a:xfrm>
           <a:custGeom>
             <a:avLst/>
@@ -7470,7 +7471,7 @@
             <a:tailEnd len="med" type="triangle" w="med"/>
           </a:ln>
           <a:effectLst>
-            <a:outerShdw dist="20160" dir="5400000">
+            <a:outerShdw dir="5400000" dist="20160">
               <a:srgbClr val="000000">
                 <a:alpha val="38000"/>
               </a:srgbClr>
@@ -7493,7 +7494,7 @@
         <p:spPr>
           <a:xfrm>
             <a:off x="3204000" y="5400000"/>
-            <a:ext cx="1943640" cy="936000"/>
+            <a:ext cx="1943280" cy="935640"/>
           </a:xfrm>
           <a:prstGeom prst="rect">
             <a:avLst/>
@@ -7530,7 +7531,7 @@
               <a:t>Traditional Algorithm:</a:t>
             </a:r>
             <a:endParaRPr b="0" lang="en-IN" sz="1200" spc="-1" strike="noStrike">
-              <a:latin typeface="Calibri"/>
+              <a:latin typeface="Arial"/>
             </a:endParaRPr>
           </a:p>
           <a:p>
@@ -7550,7 +7551,7 @@
               <a:t>Find the word in the word_sentiment.csv file and get its sentiment</a:t>
             </a:r>
             <a:endParaRPr b="0" lang="en-IN" sz="1200" spc="-1" strike="noStrike">
-              <a:latin typeface="Calibri"/>
+              <a:latin typeface="Arial"/>
             </a:endParaRPr>
           </a:p>
           <a:p>
@@ -7560,7 +7561,7 @@
               </a:lnSpc>
             </a:pPr>
             <a:endParaRPr b="0" lang="en-IN" sz="1200" spc="-1" strike="noStrike">
-              <a:latin typeface="Calibri"/>
+              <a:latin typeface="Arial"/>
             </a:endParaRPr>
           </a:p>
           <a:p>
@@ -7570,7 +7571,7 @@
               </a:lnSpc>
             </a:pPr>
             <a:endParaRPr b="0" lang="en-IN" sz="1200" spc="-1" strike="noStrike">
-              <a:latin typeface="Calibri"/>
+              <a:latin typeface="Arial"/>
             </a:endParaRPr>
           </a:p>
           <a:p>
@@ -7580,7 +7581,7 @@
               </a:lnSpc>
             </a:pPr>
             <a:endParaRPr b="0" lang="en-IN" sz="1200" spc="-1" strike="noStrike">
-              <a:latin typeface="Calibri"/>
+              <a:latin typeface="Arial"/>
             </a:endParaRPr>
           </a:p>
           <a:p>
@@ -7590,7 +7591,7 @@
               </a:lnSpc>
             </a:pPr>
             <a:endParaRPr b="0" lang="en-IN" sz="1200" spc="-1" strike="noStrike">
-              <a:latin typeface="Calibri"/>
+              <a:latin typeface="Arial"/>
             </a:endParaRPr>
           </a:p>
           <a:p>
@@ -7600,7 +7601,7 @@
               </a:lnSpc>
             </a:pPr>
             <a:endParaRPr b="0" lang="en-IN" sz="1200" spc="-1" strike="noStrike">
-              <a:latin typeface="Calibri"/>
+              <a:latin typeface="Arial"/>
             </a:endParaRPr>
           </a:p>
         </p:txBody>
@@ -7614,7 +7615,7 @@
         <p:spPr>
           <a:xfrm>
             <a:off x="1548000" y="5616000"/>
-            <a:ext cx="1080000" cy="504000"/>
+            <a:ext cx="1079640" cy="503640"/>
           </a:xfrm>
           <a:prstGeom prst="rect">
             <a:avLst/>
@@ -7652,7 +7653,7 @@
               </a:rPr>
               <a:t>Input Word</a:t>
             </a:r>
-            <a:endParaRPr b="0" i="1" lang="en-IN" sz="1400" spc="-1" strike="noStrike">
+            <a:endParaRPr b="0" lang="en-IN" sz="1400" spc="-1" strike="noStrike">
               <a:latin typeface="Arial"/>
             </a:endParaRPr>
           </a:p>
@@ -7667,7 +7668,7 @@
         <p:spPr>
           <a:xfrm>
             <a:off x="5760000" y="5573520"/>
-            <a:ext cx="1152000" cy="510480"/>
+            <a:ext cx="1151640" cy="510120"/>
           </a:xfrm>
           <a:prstGeom prst="rect">
             <a:avLst/>
@@ -7705,7 +7706,7 @@
               </a:rPr>
               <a:t>Output sentiment</a:t>
             </a:r>
-            <a:endParaRPr b="0" i="1" lang="en-IN" sz="1400" spc="-1" strike="noStrike">
+            <a:endParaRPr b="0" lang="en-IN" sz="1400" spc="-1" strike="noStrike">
               <a:latin typeface="Arial"/>
             </a:endParaRPr>
           </a:p>
@@ -7719,8 +7720,8 @@
         </p:nvSpPr>
         <p:spPr>
           <a:xfrm flipV="1">
-            <a:off x="5147640" y="5831280"/>
-            <a:ext cx="612000" cy="360"/>
+            <a:off x="5147640" y="5830200"/>
+            <a:ext cx="611640" cy="360"/>
           </a:xfrm>
           <a:custGeom>
             <a:avLst/>
@@ -7747,7 +7748,7 @@
             <a:tailEnd len="med" type="triangle" w="med"/>
           </a:ln>
           <a:effectLst>
-            <a:outerShdw dist="20160" dir="5400000">
+            <a:outerShdw dir="5400000" dist="20160">
               <a:srgbClr val="000000">
                 <a:alpha val="38000"/>
               </a:srgbClr>
@@ -7822,7 +7823,7 @@
         <p:spPr>
           <a:xfrm>
             <a:off x="251640" y="980640"/>
-            <a:ext cx="8568360" cy="4391640"/>
+            <a:ext cx="8568000" cy="4391280"/>
           </a:xfrm>
           <a:prstGeom prst="rect">
             <a:avLst/>
@@ -7841,7 +7842,7 @@
         <p:txBody>
           <a:bodyPr lIns="90000" rIns="90000" tIns="45000" bIns="45000"/>
           <a:p>
-            <a:pPr marL="360000" indent="-359280">
+            <a:pPr marL="360000" indent="-358920">
               <a:lnSpc>
                 <a:spcPct val="130000"/>
               </a:lnSpc>
@@ -7860,6 +7861,7 @@
                   <a:srgbClr val="000000"/>
                 </a:solidFill>
                 <a:latin typeface="Calibri"/>
+                <a:ea typeface="DejaVu Sans"/>
               </a:rPr>
               <a:t>Need for labeled examples</a:t>
             </a:r>
@@ -7868,7 +7870,7 @@
             </a:endParaRPr>
           </a:p>
           <a:p>
-            <a:pPr lvl="1" marL="817200" indent="-359280">
+            <a:pPr lvl="1" marL="817200" indent="-358920">
               <a:lnSpc>
                 <a:spcPct val="130000"/>
               </a:lnSpc>
@@ -7887,6 +7889,7 @@
                   <a:srgbClr val="000000"/>
                 </a:solidFill>
                 <a:latin typeface="Calibri"/>
+                <a:ea typeface="DejaVu Sans"/>
               </a:rPr>
               <a:t>Given a set of words and their corresponding sentiment</a:t>
             </a:r>
@@ -7895,7 +7898,7 @@
             </a:endParaRPr>
           </a:p>
           <a:p>
-            <a:pPr lvl="1" marL="817200" indent="-359280">
+            <a:pPr lvl="1" marL="817200" indent="-358920">
               <a:lnSpc>
                 <a:spcPct val="130000"/>
               </a:lnSpc>
@@ -7914,6 +7917,7 @@
                   <a:srgbClr val="000000"/>
                 </a:solidFill>
                 <a:latin typeface="Calibri"/>
+                <a:ea typeface="DejaVu Sans"/>
               </a:rPr>
               <a:t>Learn from the examples what defines a good and a bad sentiment</a:t>
             </a:r>
@@ -7922,7 +7926,7 @@
             </a:endParaRPr>
           </a:p>
           <a:p>
-            <a:pPr marL="360000" indent="-359280">
+            <a:pPr marL="360000" indent="-358920">
               <a:lnSpc>
                 <a:spcPct val="130000"/>
               </a:lnSpc>
@@ -7941,6 +7945,7 @@
                   <a:srgbClr val="000000"/>
                 </a:solidFill>
                 <a:latin typeface="Calibri"/>
+                <a:ea typeface="DejaVu Sans"/>
               </a:rPr>
               <a:t>Training the algorithm</a:t>
             </a:r>
@@ -7949,7 +7954,7 @@
             </a:endParaRPr>
           </a:p>
           <a:p>
-            <a:pPr lvl="1" marL="817200" indent="-359280">
+            <a:pPr lvl="1" marL="817200" indent="-358920">
               <a:lnSpc>
                 <a:spcPct val="130000"/>
               </a:lnSpc>
@@ -7968,6 +7973,7 @@
                   <a:srgbClr val="000000"/>
                 </a:solidFill>
                 <a:latin typeface="Calibri"/>
+                <a:ea typeface="DejaVu Sans"/>
               </a:rPr>
               <a:t>Step 1 – Feature Extraction: extract features of the example words eg. length of word</a:t>
             </a:r>
@@ -7976,7 +7982,7 @@
             </a:endParaRPr>
           </a:p>
           <a:p>
-            <a:pPr lvl="1" marL="817200" indent="-359280">
+            <a:pPr lvl="1" marL="817200" indent="-358920">
               <a:lnSpc>
                 <a:spcPct val="130000"/>
               </a:lnSpc>
@@ -7995,6 +8001,7 @@
                   <a:srgbClr val="000000"/>
                 </a:solidFill>
                 <a:latin typeface="Calibri"/>
+                <a:ea typeface="DejaVu Sans"/>
               </a:rPr>
               <a:t>Step 2 – ML Algorithm to define how the features are related to the labels eg. regression</a:t>
             </a:r>
@@ -8003,7 +8010,7 @@
             </a:endParaRPr>
           </a:p>
           <a:p>
-            <a:pPr lvl="1" marL="817200" indent="-359280">
+            <a:pPr lvl="1" marL="817200" indent="-358920">
               <a:lnSpc>
                 <a:spcPct val="130000"/>
               </a:lnSpc>
@@ -8022,6 +8029,7 @@
                   <a:srgbClr val="000000"/>
                 </a:solidFill>
                 <a:latin typeface="Calibri"/>
+                <a:ea typeface="DejaVu Sans"/>
               </a:rPr>
               <a:t>Step 3 – Classifier model: The established relationship between the example words and its labels is nothing but the classifier model eg. sentiment = .3 * lenght(word)  + c </a:t>
             </a:r>
@@ -8030,7 +8038,7 @@
             </a:endParaRPr>
           </a:p>
           <a:p>
-            <a:pPr marL="360000" indent="-359280">
+            <a:pPr marL="360000" indent="-358920">
               <a:lnSpc>
                 <a:spcPct val="130000"/>
               </a:lnSpc>
@@ -8049,6 +8057,7 @@
                   <a:srgbClr val="000000"/>
                 </a:solidFill>
                 <a:latin typeface="Calibri"/>
+                <a:ea typeface="DejaVu Sans"/>
               </a:rPr>
               <a:t>Prediction</a:t>
             </a:r>
@@ -8057,7 +8066,7 @@
             </a:endParaRPr>
           </a:p>
           <a:p>
-            <a:pPr lvl="1" marL="817200" indent="-359280">
+            <a:pPr lvl="1" marL="817200" indent="-358920">
               <a:lnSpc>
                 <a:spcPct val="130000"/>
               </a:lnSpc>
@@ -8076,6 +8085,7 @@
                   <a:srgbClr val="000000"/>
                 </a:solidFill>
                 <a:latin typeface="Calibri"/>
+                <a:ea typeface="DejaVu Sans"/>
               </a:rPr>
               <a:t>Step 1 – Feature extraction of the given word eg. “Good” -  length of the word = 4</a:t>
             </a:r>
@@ -8084,7 +8094,7 @@
             </a:endParaRPr>
           </a:p>
           <a:p>
-            <a:pPr lvl="1" marL="817200" indent="-359280">
+            <a:pPr lvl="1" marL="817200" indent="-358920">
               <a:lnSpc>
                 <a:spcPct val="130000"/>
               </a:lnSpc>
@@ -8103,6 +8113,7 @@
                   <a:srgbClr val="000000"/>
                 </a:solidFill>
                 <a:latin typeface="Calibri"/>
+                <a:ea typeface="DejaVu Sans"/>
               </a:rPr>
               <a:t>Step 2 – Apply classifier model to predict the label eg. If .3*4 + c &gt; 0.5 it is good sentiment else no</a:t>
             </a:r>
@@ -8121,7 +8132,7 @@
         <p:spPr>
           <a:xfrm>
             <a:off x="1115640" y="274680"/>
-            <a:ext cx="7570440" cy="705240"/>
+            <a:ext cx="7570080" cy="704880"/>
           </a:xfrm>
           <a:prstGeom prst="rect">
             <a:avLst/>
@@ -8151,6 +8162,7 @@
                   <a:srgbClr val="084c8d"/>
                 </a:solidFill>
                 <a:latin typeface="Gill Sans"/>
+                <a:ea typeface="DejaVu Sans"/>
               </a:rPr>
               <a:t>Supervised LEARNING</a:t>
             </a:r>
@@ -8173,7 +8185,7 @@
         <p:spPr>
           <a:xfrm>
             <a:off x="1728000" y="4536000"/>
-            <a:ext cx="5399640" cy="2115000"/>
+            <a:ext cx="5399280" cy="2114640"/>
           </a:xfrm>
           <a:prstGeom prst="rect">
             <a:avLst/>
@@ -8244,7 +8256,7 @@
         <p:spPr>
           <a:xfrm>
             <a:off x="251640" y="1484640"/>
-            <a:ext cx="8424360" cy="4535640"/>
+            <a:ext cx="8424000" cy="4535280"/>
           </a:xfrm>
           <a:prstGeom prst="rect">
             <a:avLst/>
@@ -8263,7 +8275,7 @@
         <p:txBody>
           <a:bodyPr lIns="90000" rIns="90000" tIns="45000" bIns="45000"/>
           <a:p>
-            <a:pPr marL="360000" indent="-359280">
+            <a:pPr marL="360000" indent="-358920">
               <a:lnSpc>
                 <a:spcPct val="130000"/>
               </a:lnSpc>
@@ -8282,6 +8294,7 @@
                   <a:srgbClr val="000000"/>
                 </a:solidFill>
                 <a:latin typeface="Calibri"/>
+                <a:ea typeface="DejaVu Sans"/>
               </a:rPr>
               <a:t>Selecting the right features and determining how to encode them</a:t>
             </a:r>
@@ -8290,7 +8303,7 @@
             </a:endParaRPr>
           </a:p>
           <a:p>
-            <a:pPr marL="360000" indent="-359280">
+            <a:pPr marL="360000" indent="-358920">
               <a:lnSpc>
                 <a:spcPct val="130000"/>
               </a:lnSpc>
@@ -8309,6 +8322,7 @@
                   <a:srgbClr val="000000"/>
                 </a:solidFill>
                 <a:latin typeface="Calibri"/>
+                <a:ea typeface="DejaVu Sans"/>
               </a:rPr>
               <a:t>Trial and error or theories determine what features to use</a:t>
             </a:r>
@@ -8317,7 +8331,7 @@
             </a:endParaRPr>
           </a:p>
           <a:p>
-            <a:pPr marL="360000" indent="-359280">
+            <a:pPr marL="360000" indent="-358920">
               <a:lnSpc>
                 <a:spcPct val="130000"/>
               </a:lnSpc>
@@ -8336,6 +8350,7 @@
                   <a:srgbClr val="000000"/>
                 </a:solidFill>
                 <a:latin typeface="Calibri"/>
+                <a:ea typeface="DejaVu Sans"/>
               </a:rPr>
               <a:t>Overfitting</a:t>
             </a:r>
@@ -8344,7 +8359,7 @@
             </a:endParaRPr>
           </a:p>
           <a:p>
-            <a:pPr lvl="1" marL="817200" indent="-359280">
+            <a:pPr lvl="1" marL="817200" indent="-358920">
               <a:lnSpc>
                 <a:spcPct val="130000"/>
               </a:lnSpc>
@@ -8363,6 +8378,7 @@
                   <a:srgbClr val="000000"/>
                 </a:solidFill>
                 <a:latin typeface="Calibri"/>
+                <a:ea typeface="DejaVu Sans"/>
               </a:rPr>
               <a:t>Too many features</a:t>
             </a:r>
@@ -8371,7 +8387,7 @@
             </a:endParaRPr>
           </a:p>
           <a:p>
-            <a:pPr lvl="1" marL="817200" indent="-359280">
+            <a:pPr lvl="1" marL="817200" indent="-358920">
               <a:lnSpc>
                 <a:spcPct val="130000"/>
               </a:lnSpc>
@@ -8390,6 +8406,7 @@
                   <a:srgbClr val="000000"/>
                 </a:solidFill>
                 <a:latin typeface="Calibri"/>
+                <a:ea typeface="DejaVu Sans"/>
               </a:rPr>
               <a:t>Model captures idiosyncrasies of the training data</a:t>
             </a:r>
@@ -8398,7 +8415,7 @@
             </a:endParaRPr>
           </a:p>
           <a:p>
-            <a:pPr lvl="1" marL="817200" indent="-359280">
+            <a:pPr lvl="1" marL="817200" indent="-358920">
               <a:lnSpc>
                 <a:spcPct val="130000"/>
               </a:lnSpc>
@@ -8417,6 +8434,7 @@
                   <a:srgbClr val="000000"/>
                 </a:solidFill>
                 <a:latin typeface="Calibri"/>
+                <a:ea typeface="DejaVu Sans"/>
               </a:rPr>
               <a:t>Difficult to generalize</a:t>
             </a:r>
@@ -8425,7 +8443,7 @@
             </a:endParaRPr>
           </a:p>
           <a:p>
-            <a:pPr marL="360000" indent="-359280">
+            <a:pPr marL="360000" indent="-358920">
               <a:lnSpc>
                 <a:spcPct val="130000"/>
               </a:lnSpc>
@@ -8444,10 +8462,39 @@
                   <a:srgbClr val="000000"/>
                 </a:solidFill>
                 <a:latin typeface="Calibri"/>
-              </a:rPr>
-              <a:t>Error analysis : common to divide the labeled example data set into training and testing data sets </a:t>
+                <a:ea typeface="DejaVu Sans"/>
+              </a:rPr>
+              <a:t>Error analysis : common to divide the labeled example data set into training and testing data sets</a:t>
             </a:r>
             <a:endParaRPr b="0" lang="en-IN" sz="1600" spc="-1" strike="noStrike">
+              <a:latin typeface="Arial"/>
+            </a:endParaRPr>
+          </a:p>
+          <a:p>
+            <a:pPr lvl="1" marL="817200" indent="-358920">
+              <a:lnSpc>
+                <a:spcPct val="130000"/>
+              </a:lnSpc>
+              <a:spcBef>
+                <a:spcPts val="320"/>
+              </a:spcBef>
+              <a:buClr>
+                <a:srgbClr val="139cf8"/>
+              </a:buClr>
+              <a:buFont typeface="Wingdings" charset="2"/>
+              <a:buChar char=""/>
+            </a:pPr>
+            <a:r>
+              <a:rPr b="0" lang="en-IN" sz="1400" spc="-1" strike="noStrike">
+                <a:solidFill>
+                  <a:srgbClr val="000000"/>
+                </a:solidFill>
+                <a:latin typeface="Calibri"/>
+                <a:ea typeface="DejaVu Sans"/>
+              </a:rPr>
+              <a:t>Approaching AI </a:t>
+            </a:r>
+            <a:endParaRPr b="0" lang="en-IN" sz="1400" spc="-1" strike="noStrike">
               <a:latin typeface="Arial"/>
             </a:endParaRPr>
           </a:p>
@@ -8457,7 +8504,7 @@
                 <a:spcPct val="130000"/>
               </a:lnSpc>
             </a:pPr>
-            <a:endParaRPr b="0" lang="en-IN" sz="1600" spc="-1" strike="noStrike">
+            <a:endParaRPr b="0" lang="en-IN" sz="1400" spc="-1" strike="noStrike">
               <a:latin typeface="Arial"/>
             </a:endParaRPr>
           </a:p>
@@ -8467,7 +8514,7 @@
                 <a:spcPct val="130000"/>
               </a:lnSpc>
             </a:pPr>
-            <a:endParaRPr b="0" lang="en-IN" sz="1600" spc="-1" strike="noStrike">
+            <a:endParaRPr b="0" lang="en-IN" sz="1400" spc="-1" strike="noStrike">
               <a:latin typeface="Arial"/>
             </a:endParaRPr>
           </a:p>
@@ -8482,7 +8529,7 @@
         <p:spPr>
           <a:xfrm>
             <a:off x="1115640" y="274680"/>
-            <a:ext cx="7570440" cy="705240"/>
+            <a:ext cx="7570080" cy="704880"/>
           </a:xfrm>
           <a:prstGeom prst="rect">
             <a:avLst/>
@@ -8512,6 +8559,7 @@
                   <a:srgbClr val="084c8d"/>
                 </a:solidFill>
                 <a:latin typeface="Gill Sans"/>
+                <a:ea typeface="DejaVu Sans"/>
               </a:rPr>
               <a:t>FEATURE EXTRACTION</a:t>
             </a:r>
@@ -8534,7 +8582,7 @@
         <p:spPr>
           <a:xfrm>
             <a:off x="2160000" y="5040000"/>
-            <a:ext cx="3887640" cy="462240"/>
+            <a:ext cx="3887280" cy="461880"/>
           </a:xfrm>
           <a:prstGeom prst="rect">
             <a:avLst/>
@@ -8605,7 +8653,7 @@
         <p:spPr>
           <a:xfrm>
             <a:off x="251640" y="1484640"/>
-            <a:ext cx="6948360" cy="4247640"/>
+            <a:ext cx="6948000" cy="4247280"/>
           </a:xfrm>
           <a:prstGeom prst="rect">
             <a:avLst/>
@@ -8624,7 +8672,7 @@
         <p:txBody>
           <a:bodyPr lIns="90000" rIns="90000" tIns="45000" bIns="45000"/>
           <a:p>
-            <a:pPr marL="360000" indent="-359280">
+            <a:pPr marL="360000" indent="-358920">
               <a:lnSpc>
                 <a:spcPct val="130000"/>
               </a:lnSpc>
@@ -8643,6 +8691,7 @@
                   <a:srgbClr val="000000"/>
                 </a:solidFill>
                 <a:latin typeface="Calibri"/>
+                <a:ea typeface="DejaVu Sans"/>
               </a:rPr>
               <a:t>Several algorithms from regressions, decision-trees, SVM, clustering etc.</a:t>
             </a:r>
@@ -8651,7 +8700,7 @@
             </a:endParaRPr>
           </a:p>
           <a:p>
-            <a:pPr lvl="1" marL="971640" indent="-513720">
+            <a:pPr lvl="1" marL="971640" indent="-513360">
               <a:lnSpc>
                 <a:spcPct val="130000"/>
               </a:lnSpc>
@@ -8670,6 +8719,7 @@
                   <a:srgbClr val="000000"/>
                 </a:solidFill>
                 <a:latin typeface="Calibri"/>
+                <a:ea typeface="DejaVu Sans"/>
               </a:rPr>
               <a:t>Most modules treat them as black boxes eg. NLTK module</a:t>
             </a:r>
@@ -8678,7 +8728,7 @@
             </a:endParaRPr>
           </a:p>
           <a:p>
-            <a:pPr marL="360000" indent="-359280">
+            <a:pPr marL="360000" indent="-358920">
               <a:lnSpc>
                 <a:spcPct val="130000"/>
               </a:lnSpc>
@@ -8697,6 +8747,7 @@
                   <a:srgbClr val="000000"/>
                 </a:solidFill>
                 <a:latin typeface="Calibri"/>
+                <a:ea typeface="DejaVu Sans"/>
               </a:rPr>
               <a:t>Naive Bayes Method </a:t>
             </a:r>
@@ -8705,7 +8756,7 @@
             </a:endParaRPr>
           </a:p>
           <a:p>
-            <a:pPr lvl="1" marL="817200" indent="-359280">
+            <a:pPr lvl="1" marL="817200" indent="-358920">
               <a:lnSpc>
                 <a:spcPct val="130000"/>
               </a:lnSpc>
@@ -8724,6 +8775,7 @@
                   <a:srgbClr val="000000"/>
                 </a:solidFill>
                 <a:latin typeface="Calibri"/>
+                <a:ea typeface="DejaVu Sans"/>
               </a:rPr>
               <a:t>Naive Bayes assumption – feature independence</a:t>
             </a:r>
@@ -8732,7 +8784,7 @@
             </a:endParaRPr>
           </a:p>
           <a:p>
-            <a:pPr lvl="1" marL="817200" indent="-359280">
+            <a:pPr lvl="1" marL="817200" indent="-358920">
               <a:lnSpc>
                 <a:spcPct val="130000"/>
               </a:lnSpc>
@@ -8761,6 +8813,7 @@
                   <a:srgbClr val="000000"/>
                 </a:solidFill>
                 <a:latin typeface="Calibri"/>
+                <a:ea typeface="DejaVu Sans"/>
               </a:rPr>
               <a:t>P(f</a:t>
             </a:r>
@@ -8770,6 +8823,7 @@
                   <a:srgbClr val="000000"/>
                 </a:solidFill>
                 <a:latin typeface="Calibri"/>
+                <a:ea typeface="DejaVu Sans"/>
               </a:rPr>
               <a:t>1</a:t>
             </a:r>
@@ -8779,6 +8833,7 @@
                   <a:srgbClr val="000000"/>
                 </a:solidFill>
                 <a:latin typeface="Calibri"/>
+                <a:ea typeface="DejaVu Sans"/>
               </a:rPr>
               <a:t>...f</a:t>
             </a:r>
@@ -8788,6 +8843,7 @@
                   <a:srgbClr val="000000"/>
                 </a:solidFill>
                 <a:latin typeface="Calibri"/>
+                <a:ea typeface="DejaVu Sans"/>
               </a:rPr>
               <a:t>n</a:t>
             </a:r>
@@ -8797,6 +8853,7 @@
                   <a:srgbClr val="000000"/>
                 </a:solidFill>
                 <a:latin typeface="Calibri"/>
+                <a:ea typeface="DejaVu Sans"/>
               </a:rPr>
               <a:t>/label)=∏</a:t>
             </a:r>
@@ -8806,6 +8863,7 @@
                   <a:srgbClr val="000000"/>
                 </a:solidFill>
                 <a:latin typeface="Calibri"/>
+                <a:ea typeface="DejaVu Sans"/>
               </a:rPr>
               <a:t>i</a:t>
             </a:r>
@@ -8815,6 +8873,7 @@
                   <a:srgbClr val="000000"/>
                 </a:solidFill>
                 <a:latin typeface="Calibri"/>
+                <a:ea typeface="DejaVu Sans"/>
               </a:rPr>
               <a:t>P(f</a:t>
             </a:r>
@@ -8824,6 +8883,7 @@
                   <a:srgbClr val="000000"/>
                 </a:solidFill>
                 <a:latin typeface="Calibri"/>
+                <a:ea typeface="DejaVu Sans"/>
               </a:rPr>
               <a:t>i</a:t>
             </a:r>
@@ -8833,6 +8893,7 @@
                   <a:srgbClr val="000000"/>
                 </a:solidFill>
                 <a:latin typeface="Calibri"/>
+                <a:ea typeface="DejaVu Sans"/>
               </a:rPr>
               <a:t>/label)</a:t>
             </a:r>
@@ -8841,7 +8902,7 @@
             </a:endParaRPr>
           </a:p>
           <a:p>
-            <a:pPr lvl="1" marL="817200" indent="-359280">
+            <a:pPr lvl="1" marL="817200" indent="-358920">
               <a:lnSpc>
                 <a:spcPct val="130000"/>
               </a:lnSpc>
@@ -8910,6 +8971,7 @@
                   <a:srgbClr val="000000"/>
                 </a:solidFill>
                 <a:latin typeface="Calibri"/>
+                <a:ea typeface="DejaVu Sans"/>
               </a:rPr>
               <a:t>∏</a:t>
             </a:r>
@@ -8919,6 +8981,7 @@
                   <a:srgbClr val="000000"/>
                 </a:solidFill>
                 <a:latin typeface="Calibri"/>
+                <a:ea typeface="DejaVu Sans"/>
               </a:rPr>
               <a:t>i</a:t>
             </a:r>
@@ -8928,6 +8991,7 @@
                   <a:srgbClr val="000000"/>
                 </a:solidFill>
                 <a:latin typeface="Calibri"/>
+                <a:ea typeface="DejaVu Sans"/>
               </a:rPr>
               <a:t>P(f</a:t>
             </a:r>
@@ -8937,6 +9001,7 @@
                   <a:srgbClr val="000000"/>
                 </a:solidFill>
                 <a:latin typeface="Calibri"/>
+                <a:ea typeface="DejaVu Sans"/>
               </a:rPr>
               <a:t>i</a:t>
             </a:r>
@@ -8946,15 +9011,16 @@
                   <a:srgbClr val="000000"/>
                 </a:solidFill>
                 <a:latin typeface="Calibri"/>
-              </a:rPr>
-              <a:t>/label)</a:t>
+                <a:ea typeface="DejaVu Sans"/>
+              </a:rPr>
+              <a:t>/l)</a:t>
             </a:r>
             <a:endParaRPr b="0" lang="en-IN" sz="1400" spc="-1" strike="noStrike">
               <a:latin typeface="Arial"/>
             </a:endParaRPr>
           </a:p>
           <a:p>
-            <a:pPr marL="360000" indent="-359280">
+            <a:pPr marL="360000" indent="-358920">
               <a:lnSpc>
                 <a:spcPct val="130000"/>
               </a:lnSpc>
@@ -8973,6 +9039,7 @@
                   <a:srgbClr val="000000"/>
                 </a:solidFill>
                 <a:latin typeface="Calibri"/>
+                <a:ea typeface="DejaVu Sans"/>
               </a:rPr>
               <a:t>Problem of zero counts</a:t>
             </a:r>
@@ -8981,7 +9048,7 @@
             </a:endParaRPr>
           </a:p>
           <a:p>
-            <a:pPr marL="360000" indent="-359280">
+            <a:pPr marL="360000" indent="-358920">
               <a:lnSpc>
                 <a:spcPct val="130000"/>
               </a:lnSpc>
@@ -9000,6 +9067,7 @@
                   <a:srgbClr val="000000"/>
                 </a:solidFill>
                 <a:latin typeface="Calibri"/>
+                <a:ea typeface="DejaVu Sans"/>
               </a:rPr>
               <a:t>Naive assumption and possibility of double counting </a:t>
             </a:r>
@@ -9008,18 +9076,13 @@
             </a:endParaRPr>
           </a:p>
           <a:p>
-            <a:pPr marL="360000" indent="-359280">
+            <a:pPr>
               <a:lnSpc>
                 <a:spcPct val="130000"/>
               </a:lnSpc>
               <a:spcBef>
                 <a:spcPts val="360"/>
               </a:spcBef>
-              <a:buClr>
-                <a:srgbClr val="084c8d"/>
-              </a:buClr>
-              <a:buFont typeface="Wingdings" charset="2"/>
-              <a:buChar char=""/>
             </a:pPr>
             <a:endParaRPr b="0" lang="en-IN" sz="1600" spc="-1" strike="noStrike">
               <a:latin typeface="Arial"/>
@@ -9036,7 +9099,7 @@
         <p:spPr>
           <a:xfrm>
             <a:off x="1115640" y="274680"/>
-            <a:ext cx="7570440" cy="705240"/>
+            <a:ext cx="7570080" cy="704880"/>
           </a:xfrm>
           <a:prstGeom prst="rect">
             <a:avLst/>
@@ -9066,6 +9129,7 @@
                   <a:srgbClr val="084c8d"/>
                 </a:solidFill>
                 <a:latin typeface="Gill Sans"/>
+                <a:ea typeface="DejaVu Sans"/>
               </a:rPr>
               <a:t>ML Algorithm and classifier model</a:t>
             </a:r>
@@ -9088,7 +9152,7 @@
         <p:spPr>
           <a:xfrm>
             <a:off x="7416000" y="2232000"/>
-            <a:ext cx="1116000" cy="1944000"/>
+            <a:ext cx="1115640" cy="1943640"/>
           </a:xfrm>
           <a:prstGeom prst="rect">
             <a:avLst/>
@@ -9211,7 +9275,7 @@
         <p:spPr>
           <a:xfrm>
             <a:off x="457200" y="274680"/>
-            <a:ext cx="8228880" cy="1142280"/>
+            <a:ext cx="8228520" cy="1141920"/>
           </a:xfrm>
           <a:prstGeom prst="rect">
             <a:avLst/>
@@ -9237,7 +9301,7 @@
         <p:spPr>
           <a:xfrm>
             <a:off x="3744000" y="216000"/>
-            <a:ext cx="1943640" cy="936000"/>
+            <a:ext cx="1943280" cy="935640"/>
           </a:xfrm>
           <a:prstGeom prst="rect">
             <a:avLst/>
@@ -9358,7 +9422,7 @@
         <p:spPr>
           <a:xfrm>
             <a:off x="2915640" y="3321000"/>
-            <a:ext cx="1799640" cy="942480"/>
+            <a:ext cx="1799280" cy="942120"/>
           </a:xfrm>
           <a:prstGeom prst="rect">
             <a:avLst/>
@@ -9461,7 +9525,7 @@
         <p:spPr>
           <a:xfrm>
             <a:off x="1224000" y="1656000"/>
-            <a:ext cx="6984000" cy="1368000"/>
+            <a:ext cx="6983640" cy="1367640"/>
           </a:xfrm>
           <a:prstGeom prst="rect">
             <a:avLst/>
@@ -9522,7 +9586,7 @@
         <p:spPr>
           <a:xfrm>
             <a:off x="2088000" y="432000"/>
-            <a:ext cx="1080000" cy="504000"/>
+            <a:ext cx="1079640" cy="503640"/>
           </a:xfrm>
           <a:prstGeom prst="rect">
             <a:avLst/>
@@ -9560,7 +9624,7 @@
               </a:rPr>
               <a:t>Input Word</a:t>
             </a:r>
-            <a:endParaRPr b="0" i="1" lang="en-IN" sz="1400" spc="-1" strike="noStrike">
+            <a:endParaRPr b="0" lang="en-IN" sz="1400" spc="-1" strike="noStrike">
               <a:latin typeface="Arial"/>
             </a:endParaRPr>
           </a:p>
@@ -9575,7 +9639,7 @@
         <p:spPr>
           <a:xfrm>
             <a:off x="1296000" y="1944000"/>
-            <a:ext cx="936000" cy="432000"/>
+            <a:ext cx="935640" cy="431640"/>
           </a:xfrm>
           <a:prstGeom prst="rect">
             <a:avLst/>
@@ -9624,7 +9688,7 @@
               <a:t>Identified Label</a:t>
             </a:r>
             <a:endParaRPr b="0" lang="en-IN" sz="1200" spc="-1" strike="noStrike">
-              <a:latin typeface="Calibri"/>
+              <a:latin typeface="Arial"/>
             </a:endParaRPr>
           </a:p>
         </p:txBody>
@@ -9638,7 +9702,7 @@
         <p:spPr>
           <a:xfrm>
             <a:off x="5580000" y="3301200"/>
-            <a:ext cx="2159640" cy="303120"/>
+            <a:ext cx="2159280" cy="302760"/>
           </a:xfrm>
           <a:prstGeom prst="rect">
             <a:avLst/>
@@ -9691,7 +9755,7 @@
         <p:spPr>
           <a:xfrm>
             <a:off x="6300000" y="389520"/>
-            <a:ext cx="1152000" cy="510480"/>
+            <a:ext cx="1151640" cy="510120"/>
           </a:xfrm>
           <a:prstGeom prst="rect">
             <a:avLst/>
@@ -9729,7 +9793,7 @@
               </a:rPr>
               <a:t>Output sentiment</a:t>
             </a:r>
-            <a:endParaRPr b="0" i="1" lang="en-IN" sz="1400" spc="-1" strike="noStrike">
+            <a:endParaRPr b="0" lang="en-IN" sz="1400" spc="-1" strike="noStrike">
               <a:latin typeface="Arial"/>
             </a:endParaRPr>
           </a:p>
@@ -9743,8 +9807,8 @@
         </p:nvSpPr>
         <p:spPr>
           <a:xfrm flipV="1">
-            <a:off x="5687640" y="647280"/>
-            <a:ext cx="612000" cy="360"/>
+            <a:off x="5687640" y="646200"/>
+            <a:ext cx="611640" cy="360"/>
           </a:xfrm>
           <a:custGeom>
             <a:avLst/>
@@ -9771,7 +9835,7 @@
             <a:tailEnd len="med" type="triangle" w="med"/>
           </a:ln>
           <a:effectLst>
-            <a:outerShdw dist="20160" dir="5400000">
+            <a:outerShdw dir="5400000" dist="20160">
               <a:srgbClr val="000000">
                 <a:alpha val="38000"/>
               </a:srgbClr>
@@ -9794,7 +9858,7 @@
         <p:spPr>
           <a:xfrm>
             <a:off x="1224000" y="3132000"/>
-            <a:ext cx="6984000" cy="1260000"/>
+            <a:ext cx="6983640" cy="1259640"/>
           </a:xfrm>
           <a:prstGeom prst="rect">
             <a:avLst/>
@@ -9865,7 +9929,7 @@
         <p:spPr>
           <a:xfrm>
             <a:off x="1296000" y="2504880"/>
-            <a:ext cx="936000" cy="447120"/>
+            <a:ext cx="935640" cy="446760"/>
           </a:xfrm>
           <a:prstGeom prst="rect">
             <a:avLst/>
@@ -9904,7 +9968,7 @@
               <a:t>Sample Input Word</a:t>
             </a:r>
             <a:endParaRPr b="0" lang="en-IN" sz="1200" spc="-1" strike="noStrike">
-              <a:latin typeface="Calibri"/>
+              <a:latin typeface="Arial"/>
             </a:endParaRPr>
           </a:p>
         </p:txBody>
@@ -9917,8 +9981,8 @@
         </p:nvSpPr>
         <p:spPr>
           <a:xfrm flipV="1">
-            <a:off x="2232000" y="2231280"/>
-            <a:ext cx="3384000" cy="360"/>
+            <a:off x="2232000" y="2230200"/>
+            <a:ext cx="3383640" cy="360"/>
           </a:xfrm>
           <a:custGeom>
             <a:avLst/>
@@ -9945,7 +10009,7 @@
             <a:tailEnd len="med" type="triangle" w="med"/>
           </a:ln>
           <a:effectLst>
-            <a:outerShdw dist="20160" dir="5400000">
+            <a:outerShdw dir="5400000" dist="20160">
               <a:srgbClr val="000000">
                 <a:alpha val="38000"/>
               </a:srgbClr>
@@ -9968,7 +10032,7 @@
         <p:spPr>
           <a:xfrm>
             <a:off x="2664000" y="2468880"/>
-            <a:ext cx="1080000" cy="447120"/>
+            <a:ext cx="1079640" cy="446760"/>
           </a:xfrm>
           <a:prstGeom prst="rect">
             <a:avLst/>
@@ -10007,10 +10071,7 @@
               <a:t>Feature Extractor</a:t>
             </a:r>
             <a:endParaRPr b="0" lang="en-IN" sz="1200" spc="-1" strike="noStrike">
-              <a:solidFill>
-                <a:srgbClr val="dddddd"/>
-              </a:solidFill>
-              <a:latin typeface="Calibri"/>
+              <a:latin typeface="Arial"/>
             </a:endParaRPr>
           </a:p>
         </p:txBody>
@@ -10024,7 +10085,7 @@
         <p:spPr>
           <a:xfrm>
             <a:off x="4122720" y="2448000"/>
-            <a:ext cx="1079640" cy="432000"/>
+            <a:ext cx="1079280" cy="431640"/>
           </a:xfrm>
           <a:prstGeom prst="rect">
             <a:avLst/>
@@ -10063,7 +10124,7 @@
               <a:t>Features</a:t>
             </a:r>
             <a:endParaRPr b="0" lang="en-IN" sz="1200" spc="-1" strike="noStrike">
-              <a:latin typeface="Calibri"/>
+              <a:latin typeface="Arial"/>
             </a:endParaRPr>
           </a:p>
         </p:txBody>
@@ -10076,8 +10137,8 @@
         </p:nvSpPr>
         <p:spPr>
           <a:xfrm flipV="1">
-            <a:off x="3744000" y="2734920"/>
-            <a:ext cx="378720" cy="360"/>
+            <a:off x="3744000" y="2733840"/>
+            <a:ext cx="378360" cy="360"/>
           </a:xfrm>
           <a:custGeom>
             <a:avLst/>
@@ -10104,7 +10165,7 @@
             <a:tailEnd len="med" type="triangle" w="med"/>
           </a:ln>
           <a:effectLst>
-            <a:outerShdw dist="20160" dir="5400000">
+            <a:outerShdw dir="5400000" dist="20160">
               <a:srgbClr val="000000">
                 <a:alpha val="38000"/>
               </a:srgbClr>
@@ -10126,8 +10187,8 @@
         </p:nvSpPr>
         <p:spPr>
           <a:xfrm flipV="1">
-            <a:off x="5202360" y="2698920"/>
-            <a:ext cx="378720" cy="360"/>
+            <a:off x="5202360" y="2697840"/>
+            <a:ext cx="378360" cy="360"/>
           </a:xfrm>
           <a:custGeom>
             <a:avLst/>
@@ -10154,7 +10215,7 @@
             <a:tailEnd len="med" type="triangle" w="med"/>
           </a:ln>
           <a:effectLst>
-            <a:outerShdw dist="20160" dir="5400000">
+            <a:outerShdw dir="5400000" dist="20160">
               <a:srgbClr val="000000">
                 <a:alpha val="38000"/>
               </a:srgbClr>
@@ -10177,7 +10238,7 @@
         <p:spPr>
           <a:xfrm>
             <a:off x="5616000" y="2088000"/>
-            <a:ext cx="1080000" cy="792000"/>
+            <a:ext cx="1079640" cy="791640"/>
           </a:xfrm>
           <a:prstGeom prst="rect">
             <a:avLst/>
@@ -10216,10 +10277,7 @@
               <a:t>Machine Learning Algorithm</a:t>
             </a:r>
             <a:endParaRPr b="0" lang="en-IN" sz="1200" spc="-1" strike="noStrike">
-              <a:solidFill>
-                <a:srgbClr val="dddddd"/>
-              </a:solidFill>
-              <a:latin typeface="Calibri"/>
+              <a:latin typeface="Arial"/>
             </a:endParaRPr>
           </a:p>
         </p:txBody>
@@ -10233,7 +10291,7 @@
         <p:spPr>
           <a:xfrm>
             <a:off x="6191640" y="2880000"/>
-            <a:ext cx="360" cy="720000"/>
+            <a:ext cx="360" cy="719640"/>
           </a:xfrm>
           <a:custGeom>
             <a:avLst/>
@@ -10260,7 +10318,7 @@
             <a:tailEnd len="med" type="triangle" w="med"/>
           </a:ln>
           <a:effectLst>
-            <a:outerShdw dist="20160" dir="5400000">
+            <a:outerShdw dir="5400000" dist="20160">
               <a:srgbClr val="000000">
                 <a:alpha val="38000"/>
               </a:srgbClr>
@@ -10283,7 +10341,7 @@
         <p:spPr>
           <a:xfrm>
             <a:off x="1368000" y="3600000"/>
-            <a:ext cx="970920" cy="447120"/>
+            <a:ext cx="970560" cy="446760"/>
           </a:xfrm>
           <a:prstGeom prst="rect">
             <a:avLst/>
@@ -10322,7 +10380,7 @@
               <a:t>Given Input Word</a:t>
             </a:r>
             <a:endParaRPr b="0" lang="en-IN" sz="1200" spc="-1" strike="noStrike">
-              <a:latin typeface="Calibri"/>
+              <a:latin typeface="Arial"/>
             </a:endParaRPr>
           </a:p>
         </p:txBody>
@@ -10335,8 +10393,8 @@
         </p:nvSpPr>
         <p:spPr>
           <a:xfrm flipV="1">
-            <a:off x="2338920" y="3758400"/>
-            <a:ext cx="325080" cy="360"/>
+            <a:off x="2338920" y="3757320"/>
+            <a:ext cx="324720" cy="360"/>
           </a:xfrm>
           <a:custGeom>
             <a:avLst/>
@@ -10363,7 +10421,7 @@
             <a:tailEnd len="med" type="triangle" w="med"/>
           </a:ln>
           <a:effectLst>
-            <a:outerShdw dist="20160" dir="5400000">
+            <a:outerShdw dir="5400000" dist="20160">
               <a:srgbClr val="000000">
                 <a:alpha val="38000"/>
               </a:srgbClr>
@@ -10385,8 +10443,8 @@
         </p:nvSpPr>
         <p:spPr>
           <a:xfrm flipV="1">
-            <a:off x="3814920" y="3794040"/>
-            <a:ext cx="378720" cy="360"/>
+            <a:off x="3814920" y="3792960"/>
+            <a:ext cx="378360" cy="360"/>
           </a:xfrm>
           <a:custGeom>
             <a:avLst/>
@@ -10413,7 +10471,7 @@
             <a:tailEnd len="med" type="triangle" w="med"/>
           </a:ln>
           <a:effectLst>
-            <a:outerShdw dist="20160" dir="5400000">
+            <a:outerShdw dir="5400000" dist="20160">
               <a:srgbClr val="000000">
                 <a:alpha val="38000"/>
               </a:srgbClr>
@@ -10435,8 +10493,8 @@
         </p:nvSpPr>
         <p:spPr>
           <a:xfrm flipV="1">
-            <a:off x="5273280" y="3794040"/>
-            <a:ext cx="378720" cy="360"/>
+            <a:off x="5273280" y="3792960"/>
+            <a:ext cx="378360" cy="360"/>
           </a:xfrm>
           <a:custGeom>
             <a:avLst/>
@@ -10463,7 +10521,7 @@
             <a:tailEnd len="med" type="triangle" w="med"/>
           </a:ln>
           <a:effectLst>
-            <a:outerShdw dist="20160" dir="5400000">
+            <a:outerShdw dir="5400000" dist="20160">
               <a:srgbClr val="000000">
                 <a:alpha val="38000"/>
               </a:srgbClr>
@@ -10486,7 +10544,7 @@
         <p:spPr>
           <a:xfrm>
             <a:off x="2700000" y="3584880"/>
-            <a:ext cx="1080000" cy="447120"/>
+            <a:ext cx="1079640" cy="446760"/>
           </a:xfrm>
           <a:prstGeom prst="rect">
             <a:avLst/>
@@ -10525,10 +10583,7 @@
               <a:t>Feature Extractor</a:t>
             </a:r>
             <a:endParaRPr b="0" lang="en-IN" sz="1200" spc="-1" strike="noStrike">
-              <a:solidFill>
-                <a:srgbClr val="dddddd"/>
-              </a:solidFill>
-              <a:latin typeface="Calibri"/>
+              <a:latin typeface="Arial"/>
             </a:endParaRPr>
           </a:p>
         </p:txBody>
@@ -10542,7 +10597,7 @@
         <p:spPr>
           <a:xfrm>
             <a:off x="2664000" y="2468880"/>
-            <a:ext cx="1080000" cy="447120"/>
+            <a:ext cx="1079640" cy="446760"/>
           </a:xfrm>
           <a:prstGeom prst="rect">
             <a:avLst/>
@@ -10581,10 +10636,7 @@
               <a:t>Feature Extractor</a:t>
             </a:r>
             <a:endParaRPr b="0" lang="en-IN" sz="1200" spc="-1" strike="noStrike">
-              <a:solidFill>
-                <a:srgbClr val="dddddd"/>
-              </a:solidFill>
-              <a:latin typeface="Calibri"/>
+              <a:latin typeface="Arial"/>
             </a:endParaRPr>
           </a:p>
         </p:txBody>
@@ -10598,7 +10650,7 @@
         <p:spPr>
           <a:xfrm>
             <a:off x="4176360" y="3600000"/>
-            <a:ext cx="1079640" cy="432000"/>
+            <a:ext cx="1079280" cy="431640"/>
           </a:xfrm>
           <a:prstGeom prst="rect">
             <a:avLst/>
@@ -10637,7 +10689,7 @@
               <a:t>Features</a:t>
             </a:r>
             <a:endParaRPr b="0" lang="en-IN" sz="1200" spc="-1" strike="noStrike">
-              <a:latin typeface="Calibri"/>
+              <a:latin typeface="Arial"/>
             </a:endParaRPr>
           </a:p>
         </p:txBody>
@@ -10651,7 +10703,7 @@
         <p:spPr>
           <a:xfrm>
             <a:off x="5652000" y="3600000"/>
-            <a:ext cx="1080000" cy="432000"/>
+            <a:ext cx="1079640" cy="431640"/>
           </a:xfrm>
           <a:prstGeom prst="rect">
             <a:avLst/>
@@ -10690,10 +10742,7 @@
               <a:t>Classifier Model</a:t>
             </a:r>
             <a:endParaRPr b="0" lang="en-IN" sz="1200" spc="-1" strike="noStrike">
-              <a:solidFill>
-                <a:srgbClr val="dddddd"/>
-              </a:solidFill>
-              <a:latin typeface="Calibri"/>
+              <a:latin typeface="Arial"/>
             </a:endParaRPr>
           </a:p>
         </p:txBody>
@@ -10707,7 +10756,7 @@
         <p:spPr>
           <a:xfrm>
             <a:off x="7057080" y="3564000"/>
-            <a:ext cx="970920" cy="447120"/>
+            <a:ext cx="970560" cy="446760"/>
           </a:xfrm>
           <a:prstGeom prst="rect">
             <a:avLst/>
@@ -10746,7 +10795,7 @@
               <a:t>Label of Given Word</a:t>
             </a:r>
             <a:endParaRPr b="0" lang="en-IN" sz="1200" spc="-1" strike="noStrike">
-              <a:latin typeface="Calibri"/>
+              <a:latin typeface="Arial"/>
             </a:endParaRPr>
           </a:p>
         </p:txBody>
@@ -10759,8 +10808,8 @@
         </p:nvSpPr>
         <p:spPr>
           <a:xfrm flipV="1">
-            <a:off x="6732000" y="3778920"/>
-            <a:ext cx="325080" cy="360"/>
+            <a:off x="6732000" y="3777840"/>
+            <a:ext cx="324720" cy="360"/>
           </a:xfrm>
           <a:custGeom>
             <a:avLst/>
@@ -10787,7 +10836,7 @@
             <a:tailEnd len="med" type="triangle" w="med"/>
           </a:ln>
           <a:effectLst>
-            <a:outerShdw dist="20160" dir="5400000">
+            <a:outerShdw dir="5400000" dist="20160">
               <a:srgbClr val="000000">
                 <a:alpha val="38000"/>
               </a:srgbClr>
@@ -10809,8 +10858,8 @@
         </p:nvSpPr>
         <p:spPr>
           <a:xfrm flipV="1">
-            <a:off x="2267280" y="2723760"/>
-            <a:ext cx="378720" cy="360"/>
+            <a:off x="2267280" y="2722680"/>
+            <a:ext cx="378360" cy="360"/>
           </a:xfrm>
           <a:custGeom>
             <a:avLst/>
@@ -10837,7 +10886,7 @@
             <a:tailEnd len="med" type="triangle" w="med"/>
           </a:ln>
           <a:effectLst>
-            <a:outerShdw dist="20160" dir="5400000">
+            <a:outerShdw dir="5400000" dist="20160">
               <a:srgbClr val="000000">
                 <a:alpha val="38000"/>
               </a:srgbClr>

</xml_diff>

<commit_message>
near final version of the presentation
</commit_message>
<xml_diff>
--- a/Session 3/Python for docs - Session 3 V0.1.pptx
+++ b/Session 3/Python for docs - Session 3 V0.1.pptx
@@ -12860,7 +12860,7 @@
         <p:spPr>
           <a:xfrm>
             <a:off x="251640" y="1484640"/>
-            <a:ext cx="8424000" cy="4535280"/>
+            <a:ext cx="8424000" cy="3172420"/>
           </a:xfrm>
           <a:prstGeom prst="rect">
             <a:avLst/>
@@ -13075,7 +13075,7 @@
                 <a:latin typeface="Calibri"/>
                 <a:ea typeface="DejaVu Sans"/>
               </a:rPr>
-              <a:t>Error analysis : common to divide the </a:t>
+              <a:t>Error analysis : divide the </a:t>
             </a:r>
             <a:r>
               <a:rPr lang="en-IN" sz="1600" b="0" strike="noStrike" spc="-1" dirty="0" err="1">
@@ -13096,6 +13096,41 @@
                 <a:ea typeface="DejaVu Sans"/>
               </a:rPr>
               <a:t> example data set into training and testing data sets</a:t>
+            </a:r>
+          </a:p>
+          <a:p>
+            <a:pPr marL="360000" indent="-358920">
+              <a:lnSpc>
+                <a:spcPct val="130000"/>
+              </a:lnSpc>
+              <a:spcBef>
+                <a:spcPts val="320"/>
+              </a:spcBef>
+              <a:buClr>
+                <a:srgbClr val="084C8D"/>
+              </a:buClr>
+              <a:buFont typeface="Wingdings" charset="2"/>
+              <a:buChar char=""/>
+            </a:pPr>
+            <a:r>
+              <a:rPr lang="en-IN" sz="1600" b="0" strike="noStrike" spc="-1" dirty="0">
+                <a:solidFill>
+                  <a:srgbClr val="000000"/>
+                </a:solidFill>
+                <a:latin typeface="Calibri"/>
+                <a:ea typeface="DejaVu Sans"/>
+              </a:rPr>
+              <a:t>Feature identification and optimization: </a:t>
+            </a:r>
+            <a:r>
+              <a:rPr lang="en-IN" sz="1600" spc="-1" dirty="0">
+                <a:solidFill>
+                  <a:srgbClr val="000000"/>
+                </a:solidFill>
+                <a:latin typeface="Calibri"/>
+                <a:ea typeface="DejaVu Sans"/>
+              </a:rPr>
+              <a:t>create dev-test sample from the training set</a:t>
             </a:r>
             <a:endParaRPr lang="en-IN" sz="1600" b="0" strike="noStrike" spc="-1" dirty="0">
               <a:latin typeface="Arial"/>
@@ -13391,9 +13426,38 @@
               </a:rPr>
               <a:t>Naive Bayes Method </a:t>
             </a:r>
-            <a:endParaRPr lang="en-IN" sz="1600" b="0" strike="noStrike" spc="-1" dirty="0">
-              <a:latin typeface="Arial"/>
-            </a:endParaRPr>
+            <a:endParaRPr lang="en-IN" sz="1600" spc="-1" dirty="0">
+              <a:solidFill>
+                <a:srgbClr val="000000"/>
+              </a:solidFill>
+              <a:latin typeface="Calibri"/>
+              <a:ea typeface="DejaVu Sans"/>
+            </a:endParaRPr>
+          </a:p>
+          <a:p>
+            <a:pPr marL="817200" lvl="1" indent="-358920">
+              <a:lnSpc>
+                <a:spcPct val="130000"/>
+              </a:lnSpc>
+              <a:spcBef>
+                <a:spcPts val="281"/>
+              </a:spcBef>
+              <a:buClr>
+                <a:srgbClr val="139CF8"/>
+              </a:buClr>
+              <a:buFont typeface="Wingdings" charset="2"/>
+              <a:buChar char=""/>
+            </a:pPr>
+            <a:r>
+              <a:rPr lang="en-IN" sz="1400" spc="-1" dirty="0">
+                <a:solidFill>
+                  <a:srgbClr val="000000"/>
+                </a:solidFill>
+                <a:latin typeface="Calibri"/>
+                <a:ea typeface="DejaVu Sans"/>
+              </a:rPr>
+              <a:t>Calculate the most likely label given a set of features</a:t>
+            </a:r>
           </a:p>
           <a:p>
             <a:pPr marL="817200" lvl="1" indent="-358920">

</xml_diff>

<commit_message>
All the last commits
</commit_message>
<xml_diff>
--- a/Session 3/Python for docs - Session 3 V0.1.pptx
+++ b/Session 3/Python for docs - Session 3 V0.1.pptx
@@ -10677,28 +10677,6 @@
               </a:rPr>
               <a:t>How do you capture the nuances of framing a sentence ? </a:t>
             </a:r>
-            <a:r>
-              <a:rPr lang="en-IN" sz="1400" spc="-1" dirty="0" err="1">
-                <a:solidFill>
-                  <a:srgbClr val="000000"/>
-                </a:solidFill>
-                <a:latin typeface="Calibri" panose="020F0502020204030204" pitchFamily="34" charset="0"/>
-                <a:ea typeface="DejaVu Sans"/>
-                <a:cs typeface="Calibri" panose="020F0502020204030204" pitchFamily="34" charset="0"/>
-              </a:rPr>
-              <a:t>Eg.</a:t>
-            </a:r>
-            <a:r>
-              <a:rPr lang="en-IN" sz="1400" spc="-1" dirty="0">
-                <a:solidFill>
-                  <a:srgbClr val="000000"/>
-                </a:solidFill>
-                <a:latin typeface="Calibri" panose="020F0502020204030204" pitchFamily="34" charset="0"/>
-                <a:ea typeface="DejaVu Sans"/>
-                <a:cs typeface="Calibri" panose="020F0502020204030204" pitchFamily="34" charset="0"/>
-              </a:rPr>
-              <a:t> Not good</a:t>
-            </a:r>
           </a:p>
           <a:p>
             <a:pPr marL="1274400" lvl="2" indent="-358920">
@@ -12500,7 +12478,7 @@
                 <a:ea typeface="DejaVu Sans"/>
                 <a:cs typeface="Calibri" panose="020F0502020204030204" pitchFamily="34" charset="0"/>
               </a:rPr>
-              <a:t>Step 2 – ML Algorithm to define how the features are related to the labels </a:t>
+              <a:t>Step 2 – Train the ML algorithm: Establish relationship between the example words and its labels through its features </a:t>
             </a:r>
             <a:r>
               <a:rPr lang="en-IN" sz="1400" b="0" strike="noStrike" spc="-1" dirty="0" err="1">
@@ -12522,9 +12500,39 @@
                 <a:ea typeface="DejaVu Sans"/>
                 <a:cs typeface="Calibri" panose="020F0502020204030204" pitchFamily="34" charset="0"/>
               </a:rPr>
-              <a:t> regression</a:t>
+              <a:t> sentiment = .3 * length(word)  + b </a:t>
             </a:r>
             <a:endParaRPr lang="en-IN" sz="1400" b="0" strike="noStrike" spc="-1" dirty="0">
+              <a:latin typeface="Calibri" panose="020F0502020204030204" pitchFamily="34" charset="0"/>
+              <a:cs typeface="Calibri" panose="020F0502020204030204" pitchFamily="34" charset="0"/>
+            </a:endParaRPr>
+          </a:p>
+          <a:p>
+            <a:pPr marL="360000" indent="-358920">
+              <a:lnSpc>
+                <a:spcPct val="130000"/>
+              </a:lnSpc>
+              <a:spcBef>
+                <a:spcPts val="320"/>
+              </a:spcBef>
+              <a:buClr>
+                <a:srgbClr val="084C8D"/>
+              </a:buClr>
+              <a:buFont typeface="Wingdings" charset="2"/>
+              <a:buChar char=""/>
+            </a:pPr>
+            <a:r>
+              <a:rPr lang="en-IN" sz="1600" b="0" strike="noStrike" spc="-1" dirty="0">
+                <a:solidFill>
+                  <a:srgbClr val="000000"/>
+                </a:solidFill>
+                <a:latin typeface="Calibri" panose="020F0502020204030204" pitchFamily="34" charset="0"/>
+                <a:ea typeface="DejaVu Sans"/>
+                <a:cs typeface="Calibri" panose="020F0502020204030204" pitchFamily="34" charset="0"/>
+              </a:rPr>
+              <a:t>Prediction</a:t>
+            </a:r>
+            <a:endParaRPr lang="en-IN" sz="1600" b="0" strike="noStrike" spc="-1" dirty="0">
               <a:latin typeface="Calibri" panose="020F0502020204030204" pitchFamily="34" charset="0"/>
               <a:cs typeface="Calibri" panose="020F0502020204030204" pitchFamily="34" charset="0"/>
             </a:endParaRPr>
@@ -12552,7 +12560,7 @@
                 <a:ea typeface="DejaVu Sans"/>
                 <a:cs typeface="Calibri" panose="020F0502020204030204" pitchFamily="34" charset="0"/>
               </a:rPr>
-              <a:t>Step 3 – ML algorithm: The established relationship between the example words and its labels through its features </a:t>
+              <a:t>Step 1 – Feature extraction of the given word </a:t>
             </a:r>
             <a:r>
               <a:rPr lang="en-IN" sz="1400" b="0" strike="noStrike" spc="-1" dirty="0" err="1">
@@ -12574,39 +12582,9 @@
                 <a:ea typeface="DejaVu Sans"/>
                 <a:cs typeface="Calibri" panose="020F0502020204030204" pitchFamily="34" charset="0"/>
               </a:rPr>
-              <a:t> sentiment = .3 * length(word)  + b </a:t>
+              <a:t> “Good” -  length of the word = 4</a:t>
             </a:r>
             <a:endParaRPr lang="en-IN" sz="1400" b="0" strike="noStrike" spc="-1" dirty="0">
-              <a:latin typeface="Calibri" panose="020F0502020204030204" pitchFamily="34" charset="0"/>
-              <a:cs typeface="Calibri" panose="020F0502020204030204" pitchFamily="34" charset="0"/>
-            </a:endParaRPr>
-          </a:p>
-          <a:p>
-            <a:pPr marL="360000" indent="-358920">
-              <a:lnSpc>
-                <a:spcPct val="130000"/>
-              </a:lnSpc>
-              <a:spcBef>
-                <a:spcPts val="320"/>
-              </a:spcBef>
-              <a:buClr>
-                <a:srgbClr val="084C8D"/>
-              </a:buClr>
-              <a:buFont typeface="Wingdings" charset="2"/>
-              <a:buChar char=""/>
-            </a:pPr>
-            <a:r>
-              <a:rPr lang="en-IN" sz="1600" b="0" strike="noStrike" spc="-1" dirty="0">
-                <a:solidFill>
-                  <a:srgbClr val="000000"/>
-                </a:solidFill>
-                <a:latin typeface="Calibri" panose="020F0502020204030204" pitchFamily="34" charset="0"/>
-                <a:ea typeface="DejaVu Sans"/>
-                <a:cs typeface="Calibri" panose="020F0502020204030204" pitchFamily="34" charset="0"/>
-              </a:rPr>
-              <a:t>Prediction</a:t>
-            </a:r>
-            <a:endParaRPr lang="en-IN" sz="1600" b="0" strike="noStrike" spc="-1" dirty="0">
               <a:latin typeface="Calibri" panose="020F0502020204030204" pitchFamily="34" charset="0"/>
               <a:cs typeface="Calibri" panose="020F0502020204030204" pitchFamily="34" charset="0"/>
             </a:endParaRPr>
@@ -12634,58 +12612,6 @@
                 <a:ea typeface="DejaVu Sans"/>
                 <a:cs typeface="Calibri" panose="020F0502020204030204" pitchFamily="34" charset="0"/>
               </a:rPr>
-              <a:t>Step 1 – Feature extraction of the given word </a:t>
-            </a:r>
-            <a:r>
-              <a:rPr lang="en-IN" sz="1400" b="0" strike="noStrike" spc="-1" dirty="0" err="1">
-                <a:solidFill>
-                  <a:srgbClr val="000000"/>
-                </a:solidFill>
-                <a:latin typeface="Calibri" panose="020F0502020204030204" pitchFamily="34" charset="0"/>
-                <a:ea typeface="DejaVu Sans"/>
-                <a:cs typeface="Calibri" panose="020F0502020204030204" pitchFamily="34" charset="0"/>
-              </a:rPr>
-              <a:t>eg.</a:t>
-            </a:r>
-            <a:r>
-              <a:rPr lang="en-IN" sz="1400" b="0" strike="noStrike" spc="-1" dirty="0">
-                <a:solidFill>
-                  <a:srgbClr val="000000"/>
-                </a:solidFill>
-                <a:latin typeface="Calibri" panose="020F0502020204030204" pitchFamily="34" charset="0"/>
-                <a:ea typeface="DejaVu Sans"/>
-                <a:cs typeface="Calibri" panose="020F0502020204030204" pitchFamily="34" charset="0"/>
-              </a:rPr>
-              <a:t> “Good” -  length of the word = 4</a:t>
-            </a:r>
-            <a:endParaRPr lang="en-IN" sz="1400" b="0" strike="noStrike" spc="-1" dirty="0">
-              <a:latin typeface="Calibri" panose="020F0502020204030204" pitchFamily="34" charset="0"/>
-              <a:cs typeface="Calibri" panose="020F0502020204030204" pitchFamily="34" charset="0"/>
-            </a:endParaRPr>
-          </a:p>
-          <a:p>
-            <a:pPr marL="817200" lvl="1" indent="-358920">
-              <a:lnSpc>
-                <a:spcPct val="130000"/>
-              </a:lnSpc>
-              <a:spcBef>
-                <a:spcPts val="281"/>
-              </a:spcBef>
-              <a:buClr>
-                <a:srgbClr val="139CF8"/>
-              </a:buClr>
-              <a:buFont typeface="Wingdings" charset="2"/>
-              <a:buChar char=""/>
-            </a:pPr>
-            <a:r>
-              <a:rPr lang="en-IN" sz="1400" b="0" strike="noStrike" spc="-1" dirty="0">
-                <a:solidFill>
-                  <a:srgbClr val="000000"/>
-                </a:solidFill>
-                <a:latin typeface="Calibri" panose="020F0502020204030204" pitchFamily="34" charset="0"/>
-                <a:ea typeface="DejaVu Sans"/>
-                <a:cs typeface="Calibri" panose="020F0502020204030204" pitchFamily="34" charset="0"/>
-              </a:rPr>
               <a:t>Step 2 – Apply classifier model to predict the label </a:t>
             </a:r>
             <a:r>
@@ -12785,7 +12711,7 @@
         </p:blipFill>
         <p:spPr>
           <a:xfrm>
-            <a:off x="2020232" y="4468680"/>
+            <a:off x="1872360" y="4075275"/>
             <a:ext cx="5399280" cy="2114640"/>
           </a:xfrm>
           <a:prstGeom prst="rect">
@@ -13095,46 +13021,8 @@
                 <a:latin typeface="Calibri"/>
                 <a:ea typeface="DejaVu Sans"/>
               </a:rPr>
-              <a:t> example data set into training and testing data sets</a:t>
-            </a:r>
-          </a:p>
-          <a:p>
-            <a:pPr marL="360000" indent="-358920">
-              <a:lnSpc>
-                <a:spcPct val="130000"/>
-              </a:lnSpc>
-              <a:spcBef>
-                <a:spcPts val="320"/>
-              </a:spcBef>
-              <a:buClr>
-                <a:srgbClr val="084C8D"/>
-              </a:buClr>
-              <a:buFont typeface="Wingdings" charset="2"/>
-              <a:buChar char=""/>
-            </a:pPr>
-            <a:r>
-              <a:rPr lang="en-IN" sz="1600" b="0" strike="noStrike" spc="-1" dirty="0">
-                <a:solidFill>
-                  <a:srgbClr val="000000"/>
-                </a:solidFill>
-                <a:latin typeface="Calibri"/>
-                <a:ea typeface="DejaVu Sans"/>
-              </a:rPr>
-              <a:t>Feature identification and optimization: </a:t>
-            </a:r>
-            <a:r>
-              <a:rPr lang="en-IN" sz="1600" spc="-1" dirty="0">
-                <a:solidFill>
-                  <a:srgbClr val="000000"/>
-                </a:solidFill>
-                <a:latin typeface="Calibri"/>
-                <a:ea typeface="DejaVu Sans"/>
-              </a:rPr>
-              <a:t>create dev-test sample from the training set</a:t>
-            </a:r>
-            <a:endParaRPr lang="en-IN" sz="1600" b="0" strike="noStrike" spc="-1" dirty="0">
-              <a:latin typeface="Arial"/>
-            </a:endParaRPr>
+              <a:t> example data set into training, dev-testing, and prediction testing data sets</a:t>
+            </a:r>
           </a:p>
           <a:p>
             <a:pPr>

</xml_diff>